<commit_message>
Add Visual Studio Info
</commit_message>
<xml_diff>
--- a/doc/10-Apresentação.pptx
+++ b/doc/10-Apresentação.pptx
@@ -5,10 +5,10 @@
     <p:sldMasterId id="2147483656" r:id="rId1"/>
   </p:sldMasterIdLst>
   <p:notesMasterIdLst>
-    <p:notesMasterId r:id="rId18"/>
+    <p:notesMasterId r:id="rId21"/>
   </p:notesMasterIdLst>
   <p:handoutMasterIdLst>
-    <p:handoutMasterId r:id="rId19"/>
+    <p:handoutMasterId r:id="rId22"/>
   </p:handoutMasterIdLst>
   <p:sldIdLst>
     <p:sldId id="259" r:id="rId2"/>
@@ -26,7 +26,10 @@
     <p:sldId id="367" r:id="rId14"/>
     <p:sldId id="360" r:id="rId15"/>
     <p:sldId id="368" r:id="rId16"/>
-    <p:sldId id="282" r:id="rId17"/>
+    <p:sldId id="370" r:id="rId17"/>
+    <p:sldId id="371" r:id="rId18"/>
+    <p:sldId id="369" r:id="rId19"/>
+    <p:sldId id="282" r:id="rId20"/>
   </p:sldIdLst>
   <p:sldSz cx="11704638" cy="6583363"/>
   <p:notesSz cx="6797675" cy="9928225"/>
@@ -145,6 +148,9 @@
             <p14:sldId id="367"/>
             <p14:sldId id="360"/>
             <p14:sldId id="368"/>
+            <p14:sldId id="370"/>
+            <p14:sldId id="371"/>
+            <p14:sldId id="369"/>
             <p14:sldId id="282"/>
           </p14:sldIdLst>
         </p14:section>
@@ -745,6 +751,321 @@
     </a:lvl9pPr>
   </p:notesStyle>
 </p:notesMaster>
+</file>
+
+<file path=ppt/notesSlides/notesSlide1.xml><?xml version="1.0" encoding="utf-8"?>
+<p:notes xmlns:a="http://schemas.openxmlformats.org/drawingml/2006/main" xmlns:r="http://schemas.openxmlformats.org/officeDocument/2006/relationships" xmlns:p="http://schemas.openxmlformats.org/presentationml/2006/main">
+  <p:cSld>
+    <p:spTree>
+      <p:nvGrpSpPr>
+        <p:cNvPr id="1" name=""/>
+        <p:cNvGrpSpPr/>
+        <p:nvPr/>
+      </p:nvGrpSpPr>
+      <p:grpSpPr>
+        <a:xfrm>
+          <a:off x="0" y="0"/>
+          <a:ext cx="0" cy="0"/>
+          <a:chOff x="0" y="0"/>
+          <a:chExt cx="0" cy="0"/>
+        </a:xfrm>
+      </p:grpSpPr>
+      <p:sp>
+        <p:nvSpPr>
+          <p:cNvPr id="2" name="Slide Image Placeholder 1"/>
+          <p:cNvSpPr>
+            <a:spLocks noGrp="1" noRot="1" noChangeAspect="1"/>
+          </p:cNvSpPr>
+          <p:nvPr>
+            <p:ph type="sldImg"/>
+          </p:nvPr>
+        </p:nvSpPr>
+        <p:spPr/>
+      </p:sp>
+      <p:sp>
+        <p:nvSpPr>
+          <p:cNvPr id="3" name="Notes Placeholder 2"/>
+          <p:cNvSpPr>
+            <a:spLocks noGrp="1"/>
+          </p:cNvSpPr>
+          <p:nvPr>
+            <p:ph type="body" idx="1"/>
+          </p:nvPr>
+        </p:nvSpPr>
+        <p:spPr/>
+        <p:txBody>
+          <a:bodyPr/>
+          <a:lstStyle/>
+          <a:p>
+            <a:pPr marL="285750" indent="-285750" fontAlgn="ctr">
+              <a:buFont typeface="Arial" panose="020B0604020202020204" pitchFamily="34" charset="0"/>
+              <a:buChar char="•"/>
+            </a:pPr>
+            <a:r>
+              <a:rPr lang="pt-PT" sz="1600" b="1" dirty="0" smtClean="0"/>
+              <a:t>Create project</a:t>
+            </a:r>
+            <a:endParaRPr lang="pt-PT" sz="1200" dirty="0" smtClean="0"/>
+          </a:p>
+          <a:p>
+            <a:pPr marL="870966" lvl="1" indent="-285750" fontAlgn="ctr">
+              <a:buFont typeface="Arial" panose="020B0604020202020204" pitchFamily="34" charset="0"/>
+              <a:buChar char="•"/>
+            </a:pPr>
+            <a:r>
+              <a:rPr lang="pt-PT" sz="1600" b="1" dirty="0" smtClean="0"/>
+              <a:t>Add file</a:t>
+            </a:r>
+            <a:endParaRPr lang="pt-PT" sz="1200" dirty="0" smtClean="0"/>
+          </a:p>
+          <a:p>
+            <a:pPr marL="285750" indent="-285750" fontAlgn="ctr">
+              <a:buFont typeface="Arial" panose="020B0604020202020204" pitchFamily="34" charset="0"/>
+              <a:buChar char="•"/>
+            </a:pPr>
+            <a:r>
+              <a:rPr lang="pt-PT" sz="1600" b="1" dirty="0" smtClean="0"/>
+              <a:t>Snake</a:t>
+            </a:r>
+            <a:endParaRPr lang="pt-PT" sz="1200" dirty="0" smtClean="0"/>
+          </a:p>
+          <a:p>
+            <a:pPr marL="870966" lvl="1" indent="-285750" fontAlgn="ctr">
+              <a:buFont typeface="Arial" panose="020B0604020202020204" pitchFamily="34" charset="0"/>
+              <a:buChar char="•"/>
+            </a:pPr>
+            <a:r>
+              <a:rPr lang="pt-PT" sz="1600" b="1" dirty="0" smtClean="0"/>
+              <a:t>Show classification</a:t>
+            </a:r>
+            <a:endParaRPr lang="pt-PT" sz="1200" dirty="0" smtClean="0"/>
+          </a:p>
+          <a:p>
+            <a:pPr marL="870966" lvl="1" indent="-285750" fontAlgn="ctr">
+              <a:buFont typeface="Arial" panose="020B0604020202020204" pitchFamily="34" charset="0"/>
+              <a:buChar char="•"/>
+            </a:pPr>
+            <a:r>
+              <a:rPr lang="pt-PT" sz="1600" b="1" dirty="0" smtClean="0"/>
+              <a:t>Show intellisense</a:t>
+            </a:r>
+            <a:endParaRPr lang="pt-PT" sz="1200" dirty="0" smtClean="0"/>
+          </a:p>
+          <a:p>
+            <a:pPr marL="870966" lvl="1" indent="-285750" fontAlgn="ctr">
+              <a:buFont typeface="Arial" panose="020B0604020202020204" pitchFamily="34" charset="0"/>
+              <a:buChar char="•"/>
+            </a:pPr>
+            <a:r>
+              <a:rPr lang="pt-PT" sz="1600" b="1" dirty="0" smtClean="0"/>
+              <a:t>Show Error Validation</a:t>
+            </a:r>
+            <a:endParaRPr lang="pt-PT" sz="1200" dirty="0" smtClean="0"/>
+          </a:p>
+          <a:p>
+            <a:pPr marL="1456182" lvl="2" indent="-285750" fontAlgn="ctr">
+              <a:buFont typeface="Arial" panose="020B0604020202020204" pitchFamily="34" charset="0"/>
+              <a:buChar char="•"/>
+            </a:pPr>
+            <a:r>
+              <a:rPr lang="pt-PT" sz="1600" b="1" dirty="0" smtClean="0"/>
+              <a:t>Inline</a:t>
+            </a:r>
+            <a:endParaRPr lang="pt-PT" sz="1200" dirty="0" smtClean="0"/>
+          </a:p>
+          <a:p>
+            <a:pPr marL="1456182" lvl="2" indent="-285750" fontAlgn="ctr">
+              <a:buFont typeface="Arial" panose="020B0604020202020204" pitchFamily="34" charset="0"/>
+              <a:buChar char="•"/>
+            </a:pPr>
+            <a:r>
+              <a:rPr lang="pt-PT" sz="1600" b="1" dirty="0" smtClean="0"/>
+              <a:t>Error window</a:t>
+            </a:r>
+            <a:endParaRPr lang="pt-PT" sz="1200" dirty="0" smtClean="0"/>
+          </a:p>
+          <a:p>
+            <a:pPr marL="870966" lvl="1" indent="-285750" fontAlgn="ctr">
+              <a:buFont typeface="Arial" panose="020B0604020202020204" pitchFamily="34" charset="0"/>
+              <a:buChar char="•"/>
+            </a:pPr>
+            <a:r>
+              <a:rPr lang="pt-PT" sz="1600" b="1" dirty="0" smtClean="0"/>
+              <a:t>Show Remote window</a:t>
+            </a:r>
+            <a:endParaRPr lang="pt-PT" sz="1200" dirty="0" smtClean="0"/>
+          </a:p>
+          <a:p>
+            <a:pPr marL="870966" lvl="1" indent="-285750" fontAlgn="ctr">
+              <a:buFont typeface="Arial" panose="020B0604020202020204" pitchFamily="34" charset="0"/>
+              <a:buChar char="•"/>
+            </a:pPr>
+            <a:r>
+              <a:rPr lang="pt-PT" sz="1600" b="1" dirty="0" smtClean="0"/>
+              <a:t>Show ScreenShot window</a:t>
+            </a:r>
+            <a:endParaRPr lang="pt-PT" sz="1200" dirty="0" smtClean="0"/>
+          </a:p>
+          <a:p>
+            <a:pPr marL="870966" lvl="1" indent="-285750" fontAlgn="ctr">
+              <a:buFont typeface="Arial" panose="020B0604020202020204" pitchFamily="34" charset="0"/>
+              <a:buChar char="•"/>
+            </a:pPr>
+            <a:r>
+              <a:rPr lang="pt-PT" sz="1600" b="1" dirty="0" smtClean="0"/>
+              <a:t>Show Deploy</a:t>
+            </a:r>
+            <a:endParaRPr lang="pt-PT" sz="1200" dirty="0" smtClean="0"/>
+          </a:p>
+          <a:p>
+            <a:pPr marL="870966" lvl="1" indent="-285750" fontAlgn="ctr">
+              <a:buFont typeface="Arial" panose="020B0604020202020204" pitchFamily="34" charset="0"/>
+              <a:buChar char="•"/>
+            </a:pPr>
+            <a:r>
+              <a:rPr lang="pt-PT" sz="1600" b="1" dirty="0" smtClean="0"/>
+              <a:t>Show Debug</a:t>
+            </a:r>
+            <a:endParaRPr lang="pt-PT" sz="1200" dirty="0" smtClean="0"/>
+          </a:p>
+          <a:p>
+            <a:pPr marL="1456182" lvl="2" indent="-285750" fontAlgn="ctr">
+              <a:buFont typeface="Arial" panose="020B0604020202020204" pitchFamily="34" charset="0"/>
+              <a:buChar char="•"/>
+            </a:pPr>
+            <a:r>
+              <a:rPr lang="pt-PT" sz="1600" b="1" dirty="0" smtClean="0"/>
+              <a:t>Enter debug mode</a:t>
+            </a:r>
+            <a:endParaRPr lang="pt-PT" sz="1200" dirty="0" smtClean="0"/>
+          </a:p>
+          <a:p>
+            <a:pPr marL="1456182" lvl="2" indent="-285750" fontAlgn="ctr">
+              <a:buFont typeface="Arial" panose="020B0604020202020204" pitchFamily="34" charset="0"/>
+              <a:buChar char="•"/>
+            </a:pPr>
+            <a:r>
+              <a:rPr lang="pt-PT" sz="1600" b="1" dirty="0" smtClean="0"/>
+              <a:t>Show output</a:t>
+            </a:r>
+            <a:endParaRPr lang="pt-PT" sz="1200" dirty="0" smtClean="0"/>
+          </a:p>
+          <a:p>
+            <a:pPr marL="1456182" lvl="2" indent="-285750" fontAlgn="ctr">
+              <a:buFont typeface="Arial" panose="020B0604020202020204" pitchFamily="34" charset="0"/>
+              <a:buChar char="•"/>
+            </a:pPr>
+            <a:r>
+              <a:rPr lang="pt-PT" sz="1600" b="1" dirty="0" smtClean="0"/>
+              <a:t>Navigate call stack</a:t>
+            </a:r>
+            <a:endParaRPr lang="pt-PT" sz="1200" dirty="0" smtClean="0"/>
+          </a:p>
+          <a:p>
+            <a:pPr marL="1456182" lvl="2" indent="-285750" fontAlgn="ctr">
+              <a:buFont typeface="Arial" panose="020B0604020202020204" pitchFamily="34" charset="0"/>
+              <a:buChar char="•"/>
+            </a:pPr>
+            <a:r>
+              <a:rPr lang="pt-PT" sz="1600" b="1" dirty="0" smtClean="0"/>
+              <a:t>Show locals window</a:t>
+            </a:r>
+            <a:endParaRPr lang="pt-PT" sz="1200" dirty="0" smtClean="0"/>
+          </a:p>
+          <a:p>
+            <a:pPr marL="2041398" lvl="3" indent="-285750" fontAlgn="ctr">
+              <a:buFont typeface="Arial" panose="020B0604020202020204" pitchFamily="34" charset="0"/>
+              <a:buChar char="•"/>
+            </a:pPr>
+            <a:r>
+              <a:rPr lang="pt-PT" sz="1600" b="1" dirty="0" smtClean="0"/>
+              <a:t>Expand variable</a:t>
+            </a:r>
+            <a:endParaRPr lang="pt-PT" sz="1200" dirty="0" smtClean="0"/>
+          </a:p>
+          <a:p>
+            <a:pPr marL="1456182" lvl="2" indent="-285750" fontAlgn="ctr">
+              <a:buFont typeface="Arial" panose="020B0604020202020204" pitchFamily="34" charset="0"/>
+              <a:buChar char="•"/>
+            </a:pPr>
+            <a:r>
+              <a:rPr lang="pt-PT" sz="1600" b="1" dirty="0" smtClean="0"/>
+              <a:t>Show watch window</a:t>
+            </a:r>
+            <a:endParaRPr lang="pt-PT" sz="1200" dirty="0" smtClean="0"/>
+          </a:p>
+          <a:p>
+            <a:pPr marL="2041398" lvl="3" indent="-285750" fontAlgn="ctr">
+              <a:buFont typeface="Arial" panose="020B0604020202020204" pitchFamily="34" charset="0"/>
+              <a:buChar char="•"/>
+            </a:pPr>
+            <a:r>
+              <a:rPr lang="pt-PT" sz="1600" b="1" dirty="0" smtClean="0"/>
+              <a:t>Add to watch</a:t>
+            </a:r>
+            <a:endParaRPr lang="pt-PT" sz="1200" dirty="0" smtClean="0"/>
+          </a:p>
+          <a:p>
+            <a:pPr marL="1456182" lvl="2" indent="-285750" fontAlgn="ctr">
+              <a:buFont typeface="Arial" panose="020B0604020202020204" pitchFamily="34" charset="0"/>
+              <a:buChar char="•"/>
+            </a:pPr>
+            <a:r>
+              <a:rPr lang="pt-PT" sz="1600" b="1" dirty="0" smtClean="0"/>
+              <a:t>Step </a:t>
+            </a:r>
+            <a:endParaRPr lang="pt-PT" sz="1200" dirty="0" smtClean="0"/>
+          </a:p>
+          <a:p>
+            <a:pPr marL="1456182" lvl="2" indent="-285750" fontAlgn="ctr">
+              <a:buFont typeface="Arial" panose="020B0604020202020204" pitchFamily="34" charset="0"/>
+              <a:buChar char="•"/>
+            </a:pPr>
+            <a:r>
+              <a:rPr lang="pt-PT" sz="1600" b="1" dirty="0" smtClean="0"/>
+              <a:t>Continue</a:t>
+            </a:r>
+            <a:endParaRPr lang="pt-PT" sz="1200" dirty="0" smtClean="0"/>
+          </a:p>
+          <a:p>
+            <a:endParaRPr lang="en-GB" dirty="0"/>
+          </a:p>
+        </p:txBody>
+      </p:sp>
+      <p:sp>
+        <p:nvSpPr>
+          <p:cNvPr id="4" name="Slide Number Placeholder 3"/>
+          <p:cNvSpPr>
+            <a:spLocks noGrp="1"/>
+          </p:cNvSpPr>
+          <p:nvPr>
+            <p:ph type="sldNum" sz="quarter" idx="10"/>
+          </p:nvPr>
+        </p:nvSpPr>
+        <p:spPr/>
+        <p:txBody>
+          <a:bodyPr/>
+          <a:lstStyle/>
+          <a:p>
+            <a:fld id="{75DDEA6C-8F12-2946-8FEA-AB499F257480}" type="slidenum">
+              <a:rPr lang="en-US" smtClean="0"/>
+              <a:t>18</a:t>
+            </a:fld>
+            <a:endParaRPr lang="en-US"/>
+          </a:p>
+        </p:txBody>
+      </p:sp>
+    </p:spTree>
+    <p:extLst>
+      <p:ext uri="{BB962C8B-B14F-4D97-AF65-F5344CB8AC3E}">
+        <p14:creationId xmlns:p14="http://schemas.microsoft.com/office/powerpoint/2010/main" val="4226071021"/>
+      </p:ext>
+    </p:extLst>
+  </p:cSld>
+  <p:clrMapOvr>
+    <a:masterClrMapping/>
+  </p:clrMapOvr>
+</p:notes>
 </file>
 
 <file path=ppt/slideLayouts/slideLayout1.xml><?xml version="1.0" encoding="utf-8"?>
@@ -2971,6 +3292,13 @@
   <p:clrMapOvr>
     <a:masterClrMapping/>
   </p:clrMapOvr>
+  <p:timing>
+    <p:tnLst>
+      <p:par>
+        <p:cTn id="1" dur="indefinite" restart="never" nodeType="tmRoot"/>
+      </p:par>
+    </p:tnLst>
+  </p:timing>
 </p:sld>
 </file>
 
@@ -3419,6 +3747,13 @@
   <p:clrMapOvr>
     <a:masterClrMapping/>
   </p:clrMapOvr>
+  <p:timing>
+    <p:tnLst>
+      <p:par>
+        <p:cTn id="1" dur="indefinite" restart="never" nodeType="tmRoot"/>
+      </p:par>
+    </p:tnLst>
+  </p:timing>
 </p:sld>
 </file>
 
@@ -3762,6 +4097,13 @@
   <p:clrMapOvr>
     <a:masterClrMapping/>
   </p:clrMapOvr>
+  <p:timing>
+    <p:tnLst>
+      <p:par>
+        <p:cTn id="1" dur="indefinite" restart="never" nodeType="tmRoot"/>
+      </p:par>
+    </p:tnLst>
+  </p:timing>
 </p:sld>
 </file>
 
@@ -4322,6 +4664,13 @@
   <p:clrMapOvr>
     <a:masterClrMapping/>
   </p:clrMapOvr>
+  <p:timing>
+    <p:tnLst>
+      <p:par>
+        <p:cTn id="1" dur="indefinite" restart="never" nodeType="tmRoot"/>
+      </p:par>
+    </p:tnLst>
+  </p:timing>
 </p:sld>
 </file>
 
@@ -4827,6 +5176,13 @@
   <p:clrMapOvr>
     <a:masterClrMapping/>
   </p:clrMapOvr>
+  <p:timing>
+    <p:tnLst>
+      <p:par>
+        <p:cTn id="1" dur="indefinite" restart="never" nodeType="tmRoot"/>
+      </p:par>
+    </p:tnLst>
+  </p:timing>
 </p:sld>
 </file>
 
@@ -5391,6 +5747,13 @@
   <p:clrMapOvr>
     <a:masterClrMapping/>
   </p:clrMapOvr>
+  <p:timing>
+    <p:tnLst>
+      <p:par>
+        <p:cTn id="1" dur="indefinite" restart="never" nodeType="tmRoot"/>
+      </p:par>
+    </p:tnLst>
+  </p:timing>
 </p:sld>
 </file>
 
@@ -5955,6 +6318,13 @@
   <p:clrMapOvr>
     <a:masterClrMapping/>
   </p:clrMapOvr>
+  <p:timing>
+    <p:tnLst>
+      <p:par>
+        <p:cTn id="1" dur="indefinite" restart="never" nodeType="tmRoot"/>
+      </p:par>
+    </p:tnLst>
+  </p:timing>
 </p:sld>
 </file>
 
@@ -5987,6 +6357,1217 @@
         </p:nvSpPr>
         <p:spPr>
           <a:xfrm>
+            <a:off x="596900" y="549031"/>
+            <a:ext cx="10510839" cy="1017588"/>
+          </a:xfrm>
+        </p:spPr>
+        <p:txBody>
+          <a:bodyPr/>
+          <a:lstStyle/>
+          <a:p>
+            <a:r>
+              <a:rPr lang="en-US" dirty="0" smtClean="0"/>
+              <a:t>7-</a:t>
+            </a:r>
+            <a:r>
+              <a:rPr lang="pt-PT" dirty="0"/>
+              <a:t>Integração Visual </a:t>
+            </a:r>
+            <a:r>
+              <a:rPr lang="pt-PT" dirty="0" err="1"/>
+              <a:t>Studio</a:t>
+            </a:r>
+            <a:r>
+              <a:rPr lang="pt-PT" dirty="0"/>
+              <a:t/>
+            </a:r>
+            <a:br>
+              <a:rPr lang="pt-PT" dirty="0"/>
+            </a:br>
+            <a:endParaRPr lang="en-US" dirty="0"/>
+          </a:p>
+        </p:txBody>
+      </p:sp>
+      <p:pic>
+        <p:nvPicPr>
+          <p:cNvPr id="4" name="Picture 2" descr="http://files.isel-adeetc.webnode.pt/200000001-c7234c81be/50000000.png"/>
+          <p:cNvPicPr>
+            <a:picLocks noChangeAspect="1" noChangeArrowheads="1"/>
+          </p:cNvPicPr>
+          <p:nvPr/>
+        </p:nvPicPr>
+        <p:blipFill rotWithShape="1">
+          <a:blip r:embed="rId2">
+            <a:extLst>
+              <a:ext uri="{28A0092B-C50C-407E-A947-70E740481C1C}">
+                <a14:useLocalDpi xmlns:a14="http://schemas.microsoft.com/office/drawing/2010/main" val="0"/>
+              </a:ext>
+            </a:extLst>
+          </a:blip>
+          <a:srcRect r="25933"/>
+          <a:stretch/>
+        </p:blipFill>
+        <p:spPr bwMode="auto">
+          <a:xfrm>
+            <a:off x="9273164" y="5237391"/>
+            <a:ext cx="2277416" cy="1103120"/>
+          </a:xfrm>
+          <a:prstGeom prst="rect">
+            <a:avLst/>
+          </a:prstGeom>
+          <a:noFill/>
+          <a:extLst>
+            <a:ext uri="{909E8E84-426E-40DD-AFC4-6F175D3DCCD1}">
+              <a14:hiddenFill xmlns:a14="http://schemas.microsoft.com/office/drawing/2010/main">
+                <a:solidFill>
+                  <a:srgbClr val="FFFFFF"/>
+                </a:solidFill>
+              </a14:hiddenFill>
+            </a:ext>
+          </a:extLst>
+        </p:spPr>
+      </p:pic>
+      <p:sp>
+        <p:nvSpPr>
+          <p:cNvPr id="8" name="Content Placeholder 6"/>
+          <p:cNvSpPr txBox="1">
+            <a:spLocks/>
+          </p:cNvSpPr>
+          <p:nvPr/>
+        </p:nvSpPr>
+        <p:spPr>
+          <a:xfrm>
+            <a:off x="596900" y="1159660"/>
+            <a:ext cx="9981890" cy="4648286"/>
+          </a:xfrm>
+          <a:prstGeom prst="rect">
+            <a:avLst/>
+          </a:prstGeom>
+        </p:spPr>
+        <p:txBody>
+          <a:bodyPr/>
+          <a:lstStyle>
+            <a:lvl1pPr marL="229617" indent="-229617" algn="l" defTabSz="1170432" rtl="0" eaLnBrk="1" latinLnBrk="0" hangingPunct="1">
+              <a:spcBef>
+                <a:spcPts val="768"/>
+              </a:spcBef>
+              <a:buClr>
+                <a:schemeClr val="accent1"/>
+              </a:buClr>
+              <a:buFont typeface="Arial" pitchFamily="34" charset="0"/>
+              <a:buChar char="•"/>
+              <a:defRPr sz="1800" kern="1200">
+                <a:solidFill>
+                  <a:srgbClr val="323232"/>
+                </a:solidFill>
+                <a:latin typeface="+mn-lt"/>
+                <a:ea typeface="+mn-ea"/>
+                <a:cs typeface="+mn-cs"/>
+              </a:defRPr>
+            </a:lvl1pPr>
+            <a:lvl2pPr marL="460375" indent="-228600" algn="l" defTabSz="1170432" rtl="0" eaLnBrk="1" latinLnBrk="0" hangingPunct="1">
+              <a:spcBef>
+                <a:spcPts val="768"/>
+              </a:spcBef>
+              <a:buClr>
+                <a:schemeClr val="accent1"/>
+              </a:buClr>
+              <a:buFont typeface="Arial" pitchFamily="34" charset="0"/>
+              <a:buChar char="–"/>
+              <a:tabLst/>
+              <a:defRPr sz="1600" kern="1200">
+                <a:solidFill>
+                  <a:srgbClr val="323232"/>
+                </a:solidFill>
+                <a:latin typeface="+mn-lt"/>
+                <a:ea typeface="+mn-ea"/>
+                <a:cs typeface="+mn-cs"/>
+              </a:defRPr>
+            </a:lvl2pPr>
+            <a:lvl3pPr marL="623888" indent="-161925" algn="l" defTabSz="1170432" rtl="0" eaLnBrk="1" latinLnBrk="0" hangingPunct="1">
+              <a:spcBef>
+                <a:spcPts val="768"/>
+              </a:spcBef>
+              <a:buClr>
+                <a:schemeClr val="accent1"/>
+              </a:buClr>
+              <a:buFont typeface="Lucida Grande"/>
+              <a:buChar char="­"/>
+              <a:tabLst/>
+              <a:defRPr sz="1400" kern="1200">
+                <a:solidFill>
+                  <a:srgbClr val="323232"/>
+                </a:solidFill>
+                <a:latin typeface="+mn-lt"/>
+                <a:ea typeface="+mn-ea"/>
+                <a:cs typeface="+mn-cs"/>
+              </a:defRPr>
+            </a:lvl3pPr>
+            <a:lvl4pPr marL="893763" indent="-179388" algn="l" defTabSz="1170432" rtl="0" eaLnBrk="1" latinLnBrk="0" hangingPunct="1">
+              <a:spcBef>
+                <a:spcPts val="768"/>
+              </a:spcBef>
+              <a:buClr>
+                <a:schemeClr val="accent1"/>
+              </a:buClr>
+              <a:buFont typeface="Arial" pitchFamily="34" charset="0"/>
+              <a:buChar char="–"/>
+              <a:tabLst/>
+              <a:defRPr sz="1200" kern="1200">
+                <a:solidFill>
+                  <a:srgbClr val="323232"/>
+                </a:solidFill>
+                <a:latin typeface="+mn-lt"/>
+                <a:ea typeface="+mn-ea"/>
+                <a:cs typeface="+mn-cs"/>
+              </a:defRPr>
+            </a:lvl4pPr>
+            <a:lvl5pPr marL="2633472" indent="-292608" algn="l" defTabSz="1170432" rtl="0" eaLnBrk="1" latinLnBrk="0" hangingPunct="1">
+              <a:spcBef>
+                <a:spcPct val="20000"/>
+              </a:spcBef>
+              <a:buFont typeface="Arial" pitchFamily="34" charset="0"/>
+              <a:buChar char="»"/>
+              <a:defRPr sz="2000" kern="1200">
+                <a:solidFill>
+                  <a:schemeClr val="tx1"/>
+                </a:solidFill>
+                <a:latin typeface="+mj-lt"/>
+                <a:ea typeface="+mn-ea"/>
+                <a:cs typeface="+mn-cs"/>
+              </a:defRPr>
+            </a:lvl5pPr>
+            <a:lvl6pPr marL="3218688" indent="-292608" algn="l" defTabSz="1170432" rtl="0" eaLnBrk="1" latinLnBrk="0" hangingPunct="1">
+              <a:spcBef>
+                <a:spcPct val="20000"/>
+              </a:spcBef>
+              <a:buFont typeface="Arial" pitchFamily="34" charset="0"/>
+              <a:buChar char="•"/>
+              <a:defRPr sz="2600" kern="1200">
+                <a:solidFill>
+                  <a:schemeClr val="tx1"/>
+                </a:solidFill>
+                <a:latin typeface="+mn-lt"/>
+                <a:ea typeface="+mn-ea"/>
+                <a:cs typeface="+mn-cs"/>
+              </a:defRPr>
+            </a:lvl6pPr>
+            <a:lvl7pPr marL="3803904" indent="-292608" algn="l" defTabSz="1170432" rtl="0" eaLnBrk="1" latinLnBrk="0" hangingPunct="1">
+              <a:spcBef>
+                <a:spcPct val="20000"/>
+              </a:spcBef>
+              <a:buFont typeface="Arial" pitchFamily="34" charset="0"/>
+              <a:buChar char="•"/>
+              <a:defRPr sz="2600" kern="1200">
+                <a:solidFill>
+                  <a:schemeClr val="tx1"/>
+                </a:solidFill>
+                <a:latin typeface="+mn-lt"/>
+                <a:ea typeface="+mn-ea"/>
+                <a:cs typeface="+mn-cs"/>
+              </a:defRPr>
+            </a:lvl7pPr>
+            <a:lvl8pPr marL="4389120" indent="-292608" algn="l" defTabSz="1170432" rtl="0" eaLnBrk="1" latinLnBrk="0" hangingPunct="1">
+              <a:spcBef>
+                <a:spcPct val="20000"/>
+              </a:spcBef>
+              <a:buFont typeface="Arial" pitchFamily="34" charset="0"/>
+              <a:buChar char="•"/>
+              <a:defRPr sz="2600" kern="1200">
+                <a:solidFill>
+                  <a:schemeClr val="tx1"/>
+                </a:solidFill>
+                <a:latin typeface="+mn-lt"/>
+                <a:ea typeface="+mn-ea"/>
+                <a:cs typeface="+mn-cs"/>
+              </a:defRPr>
+            </a:lvl8pPr>
+            <a:lvl9pPr marL="4974336" indent="-292608" algn="l" defTabSz="1170432" rtl="0" eaLnBrk="1" latinLnBrk="0" hangingPunct="1">
+              <a:spcBef>
+                <a:spcPct val="20000"/>
+              </a:spcBef>
+              <a:buFont typeface="Arial" pitchFamily="34" charset="0"/>
+              <a:buChar char="•"/>
+              <a:defRPr sz="2600" kern="1200">
+                <a:solidFill>
+                  <a:schemeClr val="tx1"/>
+                </a:solidFill>
+                <a:latin typeface="+mn-lt"/>
+                <a:ea typeface="+mn-ea"/>
+                <a:cs typeface="+mn-cs"/>
+              </a:defRPr>
+            </a:lvl9pPr>
+          </a:lstStyle>
+          <a:p>
+            <a:pPr marL="342900" indent="-342900"/>
+            <a:endParaRPr lang="en-US" sz="2400" dirty="0"/>
+          </a:p>
+        </p:txBody>
+      </p:sp>
+      <p:sp>
+        <p:nvSpPr>
+          <p:cNvPr id="7" name="Content Placeholder 6"/>
+          <p:cNvSpPr txBox="1">
+            <a:spLocks/>
+          </p:cNvSpPr>
+          <p:nvPr/>
+        </p:nvSpPr>
+        <p:spPr>
+          <a:xfrm>
+            <a:off x="749300" y="1077862"/>
+            <a:ext cx="9981890" cy="4981032"/>
+          </a:xfrm>
+          <a:prstGeom prst="rect">
+            <a:avLst/>
+          </a:prstGeom>
+        </p:spPr>
+        <p:txBody>
+          <a:bodyPr/>
+          <a:lstStyle>
+            <a:lvl1pPr marL="229617" indent="-229617" algn="l" defTabSz="1170432" rtl="0" eaLnBrk="1" latinLnBrk="0" hangingPunct="1">
+              <a:spcBef>
+                <a:spcPts val="768"/>
+              </a:spcBef>
+              <a:buClr>
+                <a:schemeClr val="accent1"/>
+              </a:buClr>
+              <a:buFont typeface="Arial" pitchFamily="34" charset="0"/>
+              <a:buChar char="•"/>
+              <a:defRPr sz="1800" kern="1200">
+                <a:solidFill>
+                  <a:srgbClr val="323232"/>
+                </a:solidFill>
+                <a:latin typeface="+mn-lt"/>
+                <a:ea typeface="+mn-ea"/>
+                <a:cs typeface="+mn-cs"/>
+              </a:defRPr>
+            </a:lvl1pPr>
+            <a:lvl2pPr marL="460375" indent="-228600" algn="l" defTabSz="1170432" rtl="0" eaLnBrk="1" latinLnBrk="0" hangingPunct="1">
+              <a:spcBef>
+                <a:spcPts val="768"/>
+              </a:spcBef>
+              <a:buClr>
+                <a:schemeClr val="accent1"/>
+              </a:buClr>
+              <a:buFont typeface="Arial" pitchFamily="34" charset="0"/>
+              <a:buChar char="–"/>
+              <a:tabLst/>
+              <a:defRPr sz="1600" kern="1200">
+                <a:solidFill>
+                  <a:srgbClr val="323232"/>
+                </a:solidFill>
+                <a:latin typeface="+mn-lt"/>
+                <a:ea typeface="+mn-ea"/>
+                <a:cs typeface="+mn-cs"/>
+              </a:defRPr>
+            </a:lvl2pPr>
+            <a:lvl3pPr marL="623888" indent="-161925" algn="l" defTabSz="1170432" rtl="0" eaLnBrk="1" latinLnBrk="0" hangingPunct="1">
+              <a:spcBef>
+                <a:spcPts val="768"/>
+              </a:spcBef>
+              <a:buClr>
+                <a:schemeClr val="accent1"/>
+              </a:buClr>
+              <a:buFont typeface="Lucida Grande"/>
+              <a:buChar char="­"/>
+              <a:tabLst/>
+              <a:defRPr sz="1400" kern="1200">
+                <a:solidFill>
+                  <a:srgbClr val="323232"/>
+                </a:solidFill>
+                <a:latin typeface="+mn-lt"/>
+                <a:ea typeface="+mn-ea"/>
+                <a:cs typeface="+mn-cs"/>
+              </a:defRPr>
+            </a:lvl3pPr>
+            <a:lvl4pPr marL="893763" indent="-179388" algn="l" defTabSz="1170432" rtl="0" eaLnBrk="1" latinLnBrk="0" hangingPunct="1">
+              <a:spcBef>
+                <a:spcPts val="768"/>
+              </a:spcBef>
+              <a:buClr>
+                <a:schemeClr val="accent1"/>
+              </a:buClr>
+              <a:buFont typeface="Arial" pitchFamily="34" charset="0"/>
+              <a:buChar char="–"/>
+              <a:tabLst/>
+              <a:defRPr sz="1200" kern="1200">
+                <a:solidFill>
+                  <a:srgbClr val="323232"/>
+                </a:solidFill>
+                <a:latin typeface="+mn-lt"/>
+                <a:ea typeface="+mn-ea"/>
+                <a:cs typeface="+mn-cs"/>
+              </a:defRPr>
+            </a:lvl4pPr>
+            <a:lvl5pPr marL="2633472" indent="-292608" algn="l" defTabSz="1170432" rtl="0" eaLnBrk="1" latinLnBrk="0" hangingPunct="1">
+              <a:spcBef>
+                <a:spcPct val="20000"/>
+              </a:spcBef>
+              <a:buFont typeface="Arial" pitchFamily="34" charset="0"/>
+              <a:buChar char="»"/>
+              <a:defRPr sz="2000" kern="1200">
+                <a:solidFill>
+                  <a:schemeClr val="tx1"/>
+                </a:solidFill>
+                <a:latin typeface="+mj-lt"/>
+                <a:ea typeface="+mn-ea"/>
+                <a:cs typeface="+mn-cs"/>
+              </a:defRPr>
+            </a:lvl5pPr>
+            <a:lvl6pPr marL="3218688" indent="-292608" algn="l" defTabSz="1170432" rtl="0" eaLnBrk="1" latinLnBrk="0" hangingPunct="1">
+              <a:spcBef>
+                <a:spcPct val="20000"/>
+              </a:spcBef>
+              <a:buFont typeface="Arial" pitchFamily="34" charset="0"/>
+              <a:buChar char="•"/>
+              <a:defRPr sz="2600" kern="1200">
+                <a:solidFill>
+                  <a:schemeClr val="tx1"/>
+                </a:solidFill>
+                <a:latin typeface="+mn-lt"/>
+                <a:ea typeface="+mn-ea"/>
+                <a:cs typeface="+mn-cs"/>
+              </a:defRPr>
+            </a:lvl6pPr>
+            <a:lvl7pPr marL="3803904" indent="-292608" algn="l" defTabSz="1170432" rtl="0" eaLnBrk="1" latinLnBrk="0" hangingPunct="1">
+              <a:spcBef>
+                <a:spcPct val="20000"/>
+              </a:spcBef>
+              <a:buFont typeface="Arial" pitchFamily="34" charset="0"/>
+              <a:buChar char="•"/>
+              <a:defRPr sz="2600" kern="1200">
+                <a:solidFill>
+                  <a:schemeClr val="tx1"/>
+                </a:solidFill>
+                <a:latin typeface="+mn-lt"/>
+                <a:ea typeface="+mn-ea"/>
+                <a:cs typeface="+mn-cs"/>
+              </a:defRPr>
+            </a:lvl7pPr>
+            <a:lvl8pPr marL="4389120" indent="-292608" algn="l" defTabSz="1170432" rtl="0" eaLnBrk="1" latinLnBrk="0" hangingPunct="1">
+              <a:spcBef>
+                <a:spcPct val="20000"/>
+              </a:spcBef>
+              <a:buFont typeface="Arial" pitchFamily="34" charset="0"/>
+              <a:buChar char="•"/>
+              <a:defRPr sz="2600" kern="1200">
+                <a:solidFill>
+                  <a:schemeClr val="tx1"/>
+                </a:solidFill>
+                <a:latin typeface="+mn-lt"/>
+                <a:ea typeface="+mn-ea"/>
+                <a:cs typeface="+mn-cs"/>
+              </a:defRPr>
+            </a:lvl8pPr>
+            <a:lvl9pPr marL="4974336" indent="-292608" algn="l" defTabSz="1170432" rtl="0" eaLnBrk="1" latinLnBrk="0" hangingPunct="1">
+              <a:spcBef>
+                <a:spcPct val="20000"/>
+              </a:spcBef>
+              <a:buFont typeface="Arial" pitchFamily="34" charset="0"/>
+              <a:buChar char="•"/>
+              <a:defRPr sz="2600" kern="1200">
+                <a:solidFill>
+                  <a:schemeClr val="tx1"/>
+                </a:solidFill>
+                <a:latin typeface="+mn-lt"/>
+                <a:ea typeface="+mn-ea"/>
+                <a:cs typeface="+mn-cs"/>
+              </a:defRPr>
+            </a:lvl9pPr>
+          </a:lstStyle>
+          <a:p>
+            <a:pPr marL="342900" indent="-342900"/>
+            <a:r>
+              <a:rPr lang="pt-PT" sz="2400" dirty="0" smtClean="0"/>
+              <a:t>Register</a:t>
+            </a:r>
+          </a:p>
+          <a:p>
+            <a:pPr marL="342900" indent="-342900"/>
+            <a:r>
+              <a:rPr lang="pt-PT" sz="2400" dirty="0" smtClean="0"/>
+              <a:t>Launcher </a:t>
+            </a:r>
+            <a:endParaRPr lang="pt-PT" sz="2400" dirty="0" smtClean="0"/>
+          </a:p>
+          <a:p>
+            <a:pPr marL="342900" indent="-342900"/>
+            <a:r>
+              <a:rPr lang="pt-PT" sz="2400" dirty="0" smtClean="0"/>
+              <a:t>Debugger Engine</a:t>
+            </a:r>
+            <a:endParaRPr lang="pt-PT" sz="2000" dirty="0" smtClean="0"/>
+          </a:p>
+          <a:p>
+            <a:pPr marL="573658" lvl="1" indent="-342900"/>
+            <a:endParaRPr lang="pt-PT" sz="2000" dirty="0"/>
+          </a:p>
+        </p:txBody>
+      </p:sp>
+      <p:pic>
+        <p:nvPicPr>
+          <p:cNvPr id="6" name="Picture 5"/>
+          <p:cNvPicPr>
+            <a:picLocks noChangeAspect="1"/>
+          </p:cNvPicPr>
+          <p:nvPr/>
+        </p:nvPicPr>
+        <p:blipFill>
+          <a:blip r:embed="rId3"/>
+          <a:stretch>
+            <a:fillRect/>
+          </a:stretch>
+        </p:blipFill>
+        <p:spPr>
+          <a:xfrm>
+            <a:off x="3863935" y="1236899"/>
+            <a:ext cx="7523560" cy="3834238"/>
+          </a:xfrm>
+          <a:prstGeom prst="rect">
+            <a:avLst/>
+          </a:prstGeom>
+        </p:spPr>
+      </p:pic>
+    </p:spTree>
+    <p:extLst>
+      <p:ext uri="{BB962C8B-B14F-4D97-AF65-F5344CB8AC3E}">
+        <p14:creationId xmlns:p14="http://schemas.microsoft.com/office/powerpoint/2010/main" val="456010404"/>
+      </p:ext>
+    </p:extLst>
+  </p:cSld>
+  <p:clrMapOvr>
+    <a:masterClrMapping/>
+  </p:clrMapOvr>
+  <p:timing>
+    <p:tnLst>
+      <p:par>
+        <p:cTn id="1" dur="indefinite" restart="never" nodeType="tmRoot"/>
+      </p:par>
+    </p:tnLst>
+  </p:timing>
+</p:sld>
+</file>
+
+<file path=ppt/slides/slide17.xml><?xml version="1.0" encoding="utf-8"?>
+<p:sld xmlns:a="http://schemas.openxmlformats.org/drawingml/2006/main" xmlns:r="http://schemas.openxmlformats.org/officeDocument/2006/relationships" xmlns:p="http://schemas.openxmlformats.org/presentationml/2006/main">
+  <p:cSld>
+    <p:spTree>
+      <p:nvGrpSpPr>
+        <p:cNvPr id="1" name=""/>
+        <p:cNvGrpSpPr/>
+        <p:nvPr/>
+      </p:nvGrpSpPr>
+      <p:grpSpPr>
+        <a:xfrm>
+          <a:off x="0" y="0"/>
+          <a:ext cx="0" cy="0"/>
+          <a:chOff x="0" y="0"/>
+          <a:chExt cx="0" cy="0"/>
+        </a:xfrm>
+      </p:grpSpPr>
+      <p:sp>
+        <p:nvSpPr>
+          <p:cNvPr id="2" name="Title 1"/>
+          <p:cNvSpPr>
+            <a:spLocks noGrp="1"/>
+          </p:cNvSpPr>
+          <p:nvPr>
+            <p:ph type="title"/>
+          </p:nvPr>
+        </p:nvSpPr>
+        <p:spPr>
+          <a:xfrm>
+            <a:off x="596900" y="549031"/>
+            <a:ext cx="10510839" cy="1017588"/>
+          </a:xfrm>
+        </p:spPr>
+        <p:txBody>
+          <a:bodyPr/>
+          <a:lstStyle/>
+          <a:p>
+            <a:r>
+              <a:rPr lang="en-US" dirty="0" smtClean="0"/>
+              <a:t>7-</a:t>
+            </a:r>
+            <a:r>
+              <a:rPr lang="pt-PT" dirty="0"/>
+              <a:t>Integração Visual </a:t>
+            </a:r>
+            <a:r>
+              <a:rPr lang="pt-PT" dirty="0" err="1"/>
+              <a:t>Studio</a:t>
+            </a:r>
+            <a:r>
+              <a:rPr lang="pt-PT" dirty="0"/>
+              <a:t/>
+            </a:r>
+            <a:br>
+              <a:rPr lang="pt-PT" dirty="0"/>
+            </a:br>
+            <a:endParaRPr lang="en-US" dirty="0"/>
+          </a:p>
+        </p:txBody>
+      </p:sp>
+      <p:pic>
+        <p:nvPicPr>
+          <p:cNvPr id="4" name="Picture 2" descr="http://files.isel-adeetc.webnode.pt/200000001-c7234c81be/50000000.png"/>
+          <p:cNvPicPr>
+            <a:picLocks noChangeAspect="1" noChangeArrowheads="1"/>
+          </p:cNvPicPr>
+          <p:nvPr/>
+        </p:nvPicPr>
+        <p:blipFill rotWithShape="1">
+          <a:blip r:embed="rId2">
+            <a:extLst>
+              <a:ext uri="{28A0092B-C50C-407E-A947-70E740481C1C}">
+                <a14:useLocalDpi xmlns:a14="http://schemas.microsoft.com/office/drawing/2010/main" val="0"/>
+              </a:ext>
+            </a:extLst>
+          </a:blip>
+          <a:srcRect r="25933"/>
+          <a:stretch/>
+        </p:blipFill>
+        <p:spPr bwMode="auto">
+          <a:xfrm>
+            <a:off x="9273164" y="5237391"/>
+            <a:ext cx="2277416" cy="1103120"/>
+          </a:xfrm>
+          <a:prstGeom prst="rect">
+            <a:avLst/>
+          </a:prstGeom>
+          <a:noFill/>
+          <a:extLst>
+            <a:ext uri="{909E8E84-426E-40DD-AFC4-6F175D3DCCD1}">
+              <a14:hiddenFill xmlns:a14="http://schemas.microsoft.com/office/drawing/2010/main">
+                <a:solidFill>
+                  <a:srgbClr val="FFFFFF"/>
+                </a:solidFill>
+              </a14:hiddenFill>
+            </a:ext>
+          </a:extLst>
+        </p:spPr>
+      </p:pic>
+      <p:sp>
+        <p:nvSpPr>
+          <p:cNvPr id="8" name="Content Placeholder 6"/>
+          <p:cNvSpPr txBox="1">
+            <a:spLocks/>
+          </p:cNvSpPr>
+          <p:nvPr/>
+        </p:nvSpPr>
+        <p:spPr>
+          <a:xfrm>
+            <a:off x="596900" y="1159660"/>
+            <a:ext cx="9981890" cy="4648286"/>
+          </a:xfrm>
+          <a:prstGeom prst="rect">
+            <a:avLst/>
+          </a:prstGeom>
+        </p:spPr>
+        <p:txBody>
+          <a:bodyPr/>
+          <a:lstStyle>
+            <a:lvl1pPr marL="229617" indent="-229617" algn="l" defTabSz="1170432" rtl="0" eaLnBrk="1" latinLnBrk="0" hangingPunct="1">
+              <a:spcBef>
+                <a:spcPts val="768"/>
+              </a:spcBef>
+              <a:buClr>
+                <a:schemeClr val="accent1"/>
+              </a:buClr>
+              <a:buFont typeface="Arial" pitchFamily="34" charset="0"/>
+              <a:buChar char="•"/>
+              <a:defRPr sz="1800" kern="1200">
+                <a:solidFill>
+                  <a:srgbClr val="323232"/>
+                </a:solidFill>
+                <a:latin typeface="+mn-lt"/>
+                <a:ea typeface="+mn-ea"/>
+                <a:cs typeface="+mn-cs"/>
+              </a:defRPr>
+            </a:lvl1pPr>
+            <a:lvl2pPr marL="460375" indent="-228600" algn="l" defTabSz="1170432" rtl="0" eaLnBrk="1" latinLnBrk="0" hangingPunct="1">
+              <a:spcBef>
+                <a:spcPts val="768"/>
+              </a:spcBef>
+              <a:buClr>
+                <a:schemeClr val="accent1"/>
+              </a:buClr>
+              <a:buFont typeface="Arial" pitchFamily="34" charset="0"/>
+              <a:buChar char="–"/>
+              <a:tabLst/>
+              <a:defRPr sz="1600" kern="1200">
+                <a:solidFill>
+                  <a:srgbClr val="323232"/>
+                </a:solidFill>
+                <a:latin typeface="+mn-lt"/>
+                <a:ea typeface="+mn-ea"/>
+                <a:cs typeface="+mn-cs"/>
+              </a:defRPr>
+            </a:lvl2pPr>
+            <a:lvl3pPr marL="623888" indent="-161925" algn="l" defTabSz="1170432" rtl="0" eaLnBrk="1" latinLnBrk="0" hangingPunct="1">
+              <a:spcBef>
+                <a:spcPts val="768"/>
+              </a:spcBef>
+              <a:buClr>
+                <a:schemeClr val="accent1"/>
+              </a:buClr>
+              <a:buFont typeface="Lucida Grande"/>
+              <a:buChar char="­"/>
+              <a:tabLst/>
+              <a:defRPr sz="1400" kern="1200">
+                <a:solidFill>
+                  <a:srgbClr val="323232"/>
+                </a:solidFill>
+                <a:latin typeface="+mn-lt"/>
+                <a:ea typeface="+mn-ea"/>
+                <a:cs typeface="+mn-cs"/>
+              </a:defRPr>
+            </a:lvl3pPr>
+            <a:lvl4pPr marL="893763" indent="-179388" algn="l" defTabSz="1170432" rtl="0" eaLnBrk="1" latinLnBrk="0" hangingPunct="1">
+              <a:spcBef>
+                <a:spcPts val="768"/>
+              </a:spcBef>
+              <a:buClr>
+                <a:schemeClr val="accent1"/>
+              </a:buClr>
+              <a:buFont typeface="Arial" pitchFamily="34" charset="0"/>
+              <a:buChar char="–"/>
+              <a:tabLst/>
+              <a:defRPr sz="1200" kern="1200">
+                <a:solidFill>
+                  <a:srgbClr val="323232"/>
+                </a:solidFill>
+                <a:latin typeface="+mn-lt"/>
+                <a:ea typeface="+mn-ea"/>
+                <a:cs typeface="+mn-cs"/>
+              </a:defRPr>
+            </a:lvl4pPr>
+            <a:lvl5pPr marL="2633472" indent="-292608" algn="l" defTabSz="1170432" rtl="0" eaLnBrk="1" latinLnBrk="0" hangingPunct="1">
+              <a:spcBef>
+                <a:spcPct val="20000"/>
+              </a:spcBef>
+              <a:buFont typeface="Arial" pitchFamily="34" charset="0"/>
+              <a:buChar char="»"/>
+              <a:defRPr sz="2000" kern="1200">
+                <a:solidFill>
+                  <a:schemeClr val="tx1"/>
+                </a:solidFill>
+                <a:latin typeface="+mj-lt"/>
+                <a:ea typeface="+mn-ea"/>
+                <a:cs typeface="+mn-cs"/>
+              </a:defRPr>
+            </a:lvl5pPr>
+            <a:lvl6pPr marL="3218688" indent="-292608" algn="l" defTabSz="1170432" rtl="0" eaLnBrk="1" latinLnBrk="0" hangingPunct="1">
+              <a:spcBef>
+                <a:spcPct val="20000"/>
+              </a:spcBef>
+              <a:buFont typeface="Arial" pitchFamily="34" charset="0"/>
+              <a:buChar char="•"/>
+              <a:defRPr sz="2600" kern="1200">
+                <a:solidFill>
+                  <a:schemeClr val="tx1"/>
+                </a:solidFill>
+                <a:latin typeface="+mn-lt"/>
+                <a:ea typeface="+mn-ea"/>
+                <a:cs typeface="+mn-cs"/>
+              </a:defRPr>
+            </a:lvl6pPr>
+            <a:lvl7pPr marL="3803904" indent="-292608" algn="l" defTabSz="1170432" rtl="0" eaLnBrk="1" latinLnBrk="0" hangingPunct="1">
+              <a:spcBef>
+                <a:spcPct val="20000"/>
+              </a:spcBef>
+              <a:buFont typeface="Arial" pitchFamily="34" charset="0"/>
+              <a:buChar char="•"/>
+              <a:defRPr sz="2600" kern="1200">
+                <a:solidFill>
+                  <a:schemeClr val="tx1"/>
+                </a:solidFill>
+                <a:latin typeface="+mn-lt"/>
+                <a:ea typeface="+mn-ea"/>
+                <a:cs typeface="+mn-cs"/>
+              </a:defRPr>
+            </a:lvl7pPr>
+            <a:lvl8pPr marL="4389120" indent="-292608" algn="l" defTabSz="1170432" rtl="0" eaLnBrk="1" latinLnBrk="0" hangingPunct="1">
+              <a:spcBef>
+                <a:spcPct val="20000"/>
+              </a:spcBef>
+              <a:buFont typeface="Arial" pitchFamily="34" charset="0"/>
+              <a:buChar char="•"/>
+              <a:defRPr sz="2600" kern="1200">
+                <a:solidFill>
+                  <a:schemeClr val="tx1"/>
+                </a:solidFill>
+                <a:latin typeface="+mn-lt"/>
+                <a:ea typeface="+mn-ea"/>
+                <a:cs typeface="+mn-cs"/>
+              </a:defRPr>
+            </a:lvl8pPr>
+            <a:lvl9pPr marL="4974336" indent="-292608" algn="l" defTabSz="1170432" rtl="0" eaLnBrk="1" latinLnBrk="0" hangingPunct="1">
+              <a:spcBef>
+                <a:spcPct val="20000"/>
+              </a:spcBef>
+              <a:buFont typeface="Arial" pitchFamily="34" charset="0"/>
+              <a:buChar char="•"/>
+              <a:defRPr sz="2600" kern="1200">
+                <a:solidFill>
+                  <a:schemeClr val="tx1"/>
+                </a:solidFill>
+                <a:latin typeface="+mn-lt"/>
+                <a:ea typeface="+mn-ea"/>
+                <a:cs typeface="+mn-cs"/>
+              </a:defRPr>
+            </a:lvl9pPr>
+          </a:lstStyle>
+          <a:p>
+            <a:pPr marL="342900" indent="-342900"/>
+            <a:endParaRPr lang="en-US" sz="2400" dirty="0"/>
+          </a:p>
+        </p:txBody>
+      </p:sp>
+      <p:sp>
+        <p:nvSpPr>
+          <p:cNvPr id="7" name="Content Placeholder 6"/>
+          <p:cNvSpPr txBox="1">
+            <a:spLocks/>
+          </p:cNvSpPr>
+          <p:nvPr/>
+        </p:nvSpPr>
+        <p:spPr>
+          <a:xfrm>
+            <a:off x="749300" y="1077862"/>
+            <a:ext cx="9981890" cy="4981032"/>
+          </a:xfrm>
+          <a:prstGeom prst="rect">
+            <a:avLst/>
+          </a:prstGeom>
+        </p:spPr>
+        <p:txBody>
+          <a:bodyPr/>
+          <a:lstStyle>
+            <a:lvl1pPr marL="229617" indent="-229617" algn="l" defTabSz="1170432" rtl="0" eaLnBrk="1" latinLnBrk="0" hangingPunct="1">
+              <a:spcBef>
+                <a:spcPts val="768"/>
+              </a:spcBef>
+              <a:buClr>
+                <a:schemeClr val="accent1"/>
+              </a:buClr>
+              <a:buFont typeface="Arial" pitchFamily="34" charset="0"/>
+              <a:buChar char="•"/>
+              <a:defRPr sz="1800" kern="1200">
+                <a:solidFill>
+                  <a:srgbClr val="323232"/>
+                </a:solidFill>
+                <a:latin typeface="+mn-lt"/>
+                <a:ea typeface="+mn-ea"/>
+                <a:cs typeface="+mn-cs"/>
+              </a:defRPr>
+            </a:lvl1pPr>
+            <a:lvl2pPr marL="460375" indent="-228600" algn="l" defTabSz="1170432" rtl="0" eaLnBrk="1" latinLnBrk="0" hangingPunct="1">
+              <a:spcBef>
+                <a:spcPts val="768"/>
+              </a:spcBef>
+              <a:buClr>
+                <a:schemeClr val="accent1"/>
+              </a:buClr>
+              <a:buFont typeface="Arial" pitchFamily="34" charset="0"/>
+              <a:buChar char="–"/>
+              <a:tabLst/>
+              <a:defRPr sz="1600" kern="1200">
+                <a:solidFill>
+                  <a:srgbClr val="323232"/>
+                </a:solidFill>
+                <a:latin typeface="+mn-lt"/>
+                <a:ea typeface="+mn-ea"/>
+                <a:cs typeface="+mn-cs"/>
+              </a:defRPr>
+            </a:lvl2pPr>
+            <a:lvl3pPr marL="623888" indent="-161925" algn="l" defTabSz="1170432" rtl="0" eaLnBrk="1" latinLnBrk="0" hangingPunct="1">
+              <a:spcBef>
+                <a:spcPts val="768"/>
+              </a:spcBef>
+              <a:buClr>
+                <a:schemeClr val="accent1"/>
+              </a:buClr>
+              <a:buFont typeface="Lucida Grande"/>
+              <a:buChar char="­"/>
+              <a:tabLst/>
+              <a:defRPr sz="1400" kern="1200">
+                <a:solidFill>
+                  <a:srgbClr val="323232"/>
+                </a:solidFill>
+                <a:latin typeface="+mn-lt"/>
+                <a:ea typeface="+mn-ea"/>
+                <a:cs typeface="+mn-cs"/>
+              </a:defRPr>
+            </a:lvl3pPr>
+            <a:lvl4pPr marL="893763" indent="-179388" algn="l" defTabSz="1170432" rtl="0" eaLnBrk="1" latinLnBrk="0" hangingPunct="1">
+              <a:spcBef>
+                <a:spcPts val="768"/>
+              </a:spcBef>
+              <a:buClr>
+                <a:schemeClr val="accent1"/>
+              </a:buClr>
+              <a:buFont typeface="Arial" pitchFamily="34" charset="0"/>
+              <a:buChar char="–"/>
+              <a:tabLst/>
+              <a:defRPr sz="1200" kern="1200">
+                <a:solidFill>
+                  <a:srgbClr val="323232"/>
+                </a:solidFill>
+                <a:latin typeface="+mn-lt"/>
+                <a:ea typeface="+mn-ea"/>
+                <a:cs typeface="+mn-cs"/>
+              </a:defRPr>
+            </a:lvl4pPr>
+            <a:lvl5pPr marL="2633472" indent="-292608" algn="l" defTabSz="1170432" rtl="0" eaLnBrk="1" latinLnBrk="0" hangingPunct="1">
+              <a:spcBef>
+                <a:spcPct val="20000"/>
+              </a:spcBef>
+              <a:buFont typeface="Arial" pitchFamily="34" charset="0"/>
+              <a:buChar char="»"/>
+              <a:defRPr sz="2000" kern="1200">
+                <a:solidFill>
+                  <a:schemeClr val="tx1"/>
+                </a:solidFill>
+                <a:latin typeface="+mj-lt"/>
+                <a:ea typeface="+mn-ea"/>
+                <a:cs typeface="+mn-cs"/>
+              </a:defRPr>
+            </a:lvl5pPr>
+            <a:lvl6pPr marL="3218688" indent="-292608" algn="l" defTabSz="1170432" rtl="0" eaLnBrk="1" latinLnBrk="0" hangingPunct="1">
+              <a:spcBef>
+                <a:spcPct val="20000"/>
+              </a:spcBef>
+              <a:buFont typeface="Arial" pitchFamily="34" charset="0"/>
+              <a:buChar char="•"/>
+              <a:defRPr sz="2600" kern="1200">
+                <a:solidFill>
+                  <a:schemeClr val="tx1"/>
+                </a:solidFill>
+                <a:latin typeface="+mn-lt"/>
+                <a:ea typeface="+mn-ea"/>
+                <a:cs typeface="+mn-cs"/>
+              </a:defRPr>
+            </a:lvl6pPr>
+            <a:lvl7pPr marL="3803904" indent="-292608" algn="l" defTabSz="1170432" rtl="0" eaLnBrk="1" latinLnBrk="0" hangingPunct="1">
+              <a:spcBef>
+                <a:spcPct val="20000"/>
+              </a:spcBef>
+              <a:buFont typeface="Arial" pitchFamily="34" charset="0"/>
+              <a:buChar char="•"/>
+              <a:defRPr sz="2600" kern="1200">
+                <a:solidFill>
+                  <a:schemeClr val="tx1"/>
+                </a:solidFill>
+                <a:latin typeface="+mn-lt"/>
+                <a:ea typeface="+mn-ea"/>
+                <a:cs typeface="+mn-cs"/>
+              </a:defRPr>
+            </a:lvl7pPr>
+            <a:lvl8pPr marL="4389120" indent="-292608" algn="l" defTabSz="1170432" rtl="0" eaLnBrk="1" latinLnBrk="0" hangingPunct="1">
+              <a:spcBef>
+                <a:spcPct val="20000"/>
+              </a:spcBef>
+              <a:buFont typeface="Arial" pitchFamily="34" charset="0"/>
+              <a:buChar char="•"/>
+              <a:defRPr sz="2600" kern="1200">
+                <a:solidFill>
+                  <a:schemeClr val="tx1"/>
+                </a:solidFill>
+                <a:latin typeface="+mn-lt"/>
+                <a:ea typeface="+mn-ea"/>
+                <a:cs typeface="+mn-cs"/>
+              </a:defRPr>
+            </a:lvl8pPr>
+            <a:lvl9pPr marL="4974336" indent="-292608" algn="l" defTabSz="1170432" rtl="0" eaLnBrk="1" latinLnBrk="0" hangingPunct="1">
+              <a:spcBef>
+                <a:spcPct val="20000"/>
+              </a:spcBef>
+              <a:buFont typeface="Arial" pitchFamily="34" charset="0"/>
+              <a:buChar char="•"/>
+              <a:defRPr sz="2600" kern="1200">
+                <a:solidFill>
+                  <a:schemeClr val="tx1"/>
+                </a:solidFill>
+                <a:latin typeface="+mn-lt"/>
+                <a:ea typeface="+mn-ea"/>
+                <a:cs typeface="+mn-cs"/>
+              </a:defRPr>
+            </a:lvl9pPr>
+          </a:lstStyle>
+          <a:p>
+            <a:pPr marL="342900" indent="-342900"/>
+            <a:r>
+              <a:rPr lang="pt-PT" sz="2400" dirty="0" smtClean="0"/>
+              <a:t>DebuggedProcess</a:t>
+            </a:r>
+          </a:p>
+          <a:p>
+            <a:pPr marL="342900" indent="-342900"/>
+            <a:r>
+              <a:rPr lang="pt-PT" sz="2400" dirty="0" smtClean="0"/>
+              <a:t>EngineCallback</a:t>
+            </a:r>
+          </a:p>
+          <a:p>
+            <a:pPr marL="342900" indent="-342900"/>
+            <a:r>
+              <a:rPr lang="pt-PT" sz="2400" dirty="0" smtClean="0"/>
+              <a:t>RokuController</a:t>
+            </a:r>
+          </a:p>
+          <a:p>
+            <a:pPr marL="342900" indent="-342900"/>
+            <a:r>
+              <a:rPr lang="pt-PT" sz="2400" dirty="0" smtClean="0"/>
+              <a:t>TcpTransporter</a:t>
+            </a:r>
+          </a:p>
+          <a:p>
+            <a:pPr marL="342900" indent="-342900"/>
+            <a:r>
+              <a:rPr lang="pt-PT" sz="2400" dirty="0" smtClean="0"/>
+              <a:t>Parser</a:t>
+            </a:r>
+          </a:p>
+          <a:p>
+            <a:pPr marL="0" indent="0">
+              <a:buNone/>
+            </a:pPr>
+            <a:endParaRPr lang="pt-PT" sz="2000" dirty="0" smtClean="0"/>
+          </a:p>
+          <a:p>
+            <a:pPr marL="573658" lvl="1" indent="-342900"/>
+            <a:endParaRPr lang="pt-PT" sz="2000" dirty="0"/>
+          </a:p>
+        </p:txBody>
+      </p:sp>
+      <p:pic>
+        <p:nvPicPr>
+          <p:cNvPr id="9" name="Picture 8"/>
+          <p:cNvPicPr>
+            <a:picLocks noChangeAspect="1"/>
+          </p:cNvPicPr>
+          <p:nvPr/>
+        </p:nvPicPr>
+        <p:blipFill>
+          <a:blip r:embed="rId3"/>
+          <a:stretch>
+            <a:fillRect/>
+          </a:stretch>
+        </p:blipFill>
+        <p:spPr>
+          <a:xfrm>
+            <a:off x="4560921" y="1159659"/>
+            <a:ext cx="6954951" cy="4077731"/>
+          </a:xfrm>
+          <a:prstGeom prst="rect">
+            <a:avLst/>
+          </a:prstGeom>
+        </p:spPr>
+      </p:pic>
+    </p:spTree>
+    <p:extLst>
+      <p:ext uri="{BB962C8B-B14F-4D97-AF65-F5344CB8AC3E}">
+        <p14:creationId xmlns:p14="http://schemas.microsoft.com/office/powerpoint/2010/main" val="415741314"/>
+      </p:ext>
+    </p:extLst>
+  </p:cSld>
+  <p:clrMapOvr>
+    <a:masterClrMapping/>
+  </p:clrMapOvr>
+  <p:timing>
+    <p:tnLst>
+      <p:par>
+        <p:cTn id="1" dur="indefinite" restart="never" nodeType="tmRoot"/>
+      </p:par>
+    </p:tnLst>
+  </p:timing>
+</p:sld>
+</file>
+
+<file path=ppt/slides/slide18.xml><?xml version="1.0" encoding="utf-8"?>
+<p:sld xmlns:a="http://schemas.openxmlformats.org/drawingml/2006/main" xmlns:r="http://schemas.openxmlformats.org/officeDocument/2006/relationships" xmlns:p="http://schemas.openxmlformats.org/presentationml/2006/main">
+  <p:cSld>
+    <p:spTree>
+      <p:nvGrpSpPr>
+        <p:cNvPr id="1" name=""/>
+        <p:cNvGrpSpPr/>
+        <p:nvPr/>
+      </p:nvGrpSpPr>
+      <p:grpSpPr>
+        <a:xfrm>
+          <a:off x="0" y="0"/>
+          <a:ext cx="0" cy="0"/>
+          <a:chOff x="0" y="0"/>
+          <a:chExt cx="0" cy="0"/>
+        </a:xfrm>
+      </p:grpSpPr>
+      <p:sp>
+        <p:nvSpPr>
+          <p:cNvPr id="6" name="Title 5"/>
+          <p:cNvSpPr>
+            <a:spLocks noGrp="1"/>
+          </p:cNvSpPr>
+          <p:nvPr>
+            <p:ph type="title"/>
+          </p:nvPr>
+        </p:nvSpPr>
+        <p:spPr>
+          <a:xfrm>
+            <a:off x="596901" y="584200"/>
+            <a:ext cx="10510838" cy="520700"/>
+          </a:xfrm>
+        </p:spPr>
+        <p:txBody>
+          <a:bodyPr/>
+          <a:lstStyle/>
+          <a:p>
+            <a:r>
+              <a:rPr lang="en-US" dirty="0"/>
+              <a:t>7-</a:t>
+            </a:r>
+            <a:r>
+              <a:rPr lang="pt-PT" dirty="0"/>
+              <a:t>Integração Visual Studio</a:t>
+            </a:r>
+            <a:r>
+              <a:rPr lang="pt-PT" dirty="0"/>
+              <a:t/>
+            </a:r>
+            <a:br>
+              <a:rPr lang="pt-PT" dirty="0"/>
+            </a:br>
+            <a:r>
+              <a:rPr lang="en-US" dirty="0"/>
+              <a:t> </a:t>
+            </a:r>
+          </a:p>
+        </p:txBody>
+      </p:sp>
+      <p:sp>
+        <p:nvSpPr>
+          <p:cNvPr id="7" name="Content Placeholder 6"/>
+          <p:cNvSpPr>
+            <a:spLocks noGrp="1"/>
+          </p:cNvSpPr>
+          <p:nvPr>
+            <p:ph sz="half" idx="1"/>
+          </p:nvPr>
+        </p:nvSpPr>
+        <p:spPr>
+          <a:xfrm>
+            <a:off x="596901" y="1413208"/>
+            <a:ext cx="3331043" cy="3734780"/>
+          </a:xfrm>
+        </p:spPr>
+        <p:txBody>
+          <a:bodyPr/>
+          <a:lstStyle/>
+          <a:p>
+            <a:r>
+              <a:rPr lang="pt-PT" sz="6000" dirty="0" smtClean="0"/>
+              <a:t>Demo</a:t>
+            </a:r>
+            <a:endParaRPr lang="pt-PT" sz="6000" dirty="0"/>
+          </a:p>
+          <a:p>
+            <a:pPr marL="342900" indent="-342900">
+              <a:buFont typeface="+mj-lt"/>
+              <a:buAutoNum type="arabicPeriod"/>
+            </a:pPr>
+            <a:endParaRPr lang="en-US" sz="6600" dirty="0"/>
+          </a:p>
+        </p:txBody>
+      </p:sp>
+      <p:pic>
+        <p:nvPicPr>
+          <p:cNvPr id="1026" name="Picture 2" descr="http://files.isel-adeetc.webnode.pt/200000001-c7234c81be/50000000.png"/>
+          <p:cNvPicPr>
+            <a:picLocks noChangeAspect="1" noChangeArrowheads="1"/>
+          </p:cNvPicPr>
+          <p:nvPr/>
+        </p:nvPicPr>
+        <p:blipFill rotWithShape="1">
+          <a:blip r:embed="rId3">
+            <a:extLst>
+              <a:ext uri="{28A0092B-C50C-407E-A947-70E740481C1C}">
+                <a14:useLocalDpi xmlns:a14="http://schemas.microsoft.com/office/drawing/2010/main" val="0"/>
+              </a:ext>
+            </a:extLst>
+          </a:blip>
+          <a:srcRect r="25933"/>
+          <a:stretch/>
+        </p:blipFill>
+        <p:spPr bwMode="auto">
+          <a:xfrm>
+            <a:off x="9273164" y="5237391"/>
+            <a:ext cx="2277416" cy="1103120"/>
+          </a:xfrm>
+          <a:prstGeom prst="rect">
+            <a:avLst/>
+          </a:prstGeom>
+          <a:noFill/>
+          <a:extLst>
+            <a:ext uri="{909E8E84-426E-40DD-AFC4-6F175D3DCCD1}">
+              <a14:hiddenFill xmlns:a14="http://schemas.microsoft.com/office/drawing/2010/main">
+                <a:solidFill>
+                  <a:srgbClr val="FFFFFF"/>
+                </a:solidFill>
+              </a14:hiddenFill>
+            </a:ext>
+          </a:extLst>
+        </p:spPr>
+      </p:pic>
+    </p:spTree>
+    <p:extLst>
+      <p:ext uri="{BB962C8B-B14F-4D97-AF65-F5344CB8AC3E}">
+        <p14:creationId xmlns:p14="http://schemas.microsoft.com/office/powerpoint/2010/main" val="4187701856"/>
+      </p:ext>
+    </p:extLst>
+  </p:cSld>
+  <p:clrMapOvr>
+    <a:masterClrMapping/>
+  </p:clrMapOvr>
+  <p:timing>
+    <p:tnLst>
+      <p:par>
+        <p:cTn id="1" dur="indefinite" restart="never" nodeType="tmRoot"/>
+      </p:par>
+    </p:tnLst>
+  </p:timing>
+</p:sld>
+</file>
+
+<file path=ppt/slides/slide19.xml><?xml version="1.0" encoding="utf-8"?>
+<p:sld xmlns:a="http://schemas.openxmlformats.org/drawingml/2006/main" xmlns:r="http://schemas.openxmlformats.org/officeDocument/2006/relationships" xmlns:p="http://schemas.openxmlformats.org/presentationml/2006/main">
+  <p:cSld>
+    <p:spTree>
+      <p:nvGrpSpPr>
+        <p:cNvPr id="1" name=""/>
+        <p:cNvGrpSpPr/>
+        <p:nvPr/>
+      </p:nvGrpSpPr>
+      <p:grpSpPr>
+        <a:xfrm>
+          <a:off x="0" y="0"/>
+          <a:ext cx="0" cy="0"/>
+          <a:chOff x="0" y="0"/>
+          <a:chExt cx="0" cy="0"/>
+        </a:xfrm>
+      </p:grpSpPr>
+      <p:sp>
+        <p:nvSpPr>
+          <p:cNvPr id="2" name="Title 1"/>
+          <p:cNvSpPr>
+            <a:spLocks noGrp="1"/>
+          </p:cNvSpPr>
+          <p:nvPr>
+            <p:ph type="title"/>
+          </p:nvPr>
+        </p:nvSpPr>
+        <p:spPr>
+          <a:xfrm>
             <a:off x="551682" y="1094763"/>
             <a:ext cx="10510839" cy="3110471"/>
           </a:xfrm>
@@ -6104,6 +7685,13 @@
   <p:clrMapOvr>
     <a:masterClrMapping/>
   </p:clrMapOvr>
+  <p:timing>
+    <p:tnLst>
+      <p:par>
+        <p:cTn id="1" dur="indefinite" restart="never" nodeType="tmRoot"/>
+      </p:par>
+    </p:tnLst>
+  </p:timing>
 </p:sld>
 </file>
 
@@ -6319,6 +7907,13 @@
   <p:clrMapOvr>
     <a:masterClrMapping/>
   </p:clrMapOvr>
+  <p:timing>
+    <p:tnLst>
+      <p:par>
+        <p:cTn id="1" dur="indefinite" restart="never" nodeType="tmRoot"/>
+      </p:par>
+    </p:tnLst>
+  </p:timing>
 </p:sld>
 </file>
 
@@ -6713,6 +8308,13 @@
   <p:clrMapOvr>
     <a:masterClrMapping/>
   </p:clrMapOvr>
+  <p:timing>
+    <p:tnLst>
+      <p:par>
+        <p:cTn id="1" dur="indefinite" restart="never" nodeType="tmRoot"/>
+      </p:par>
+    </p:tnLst>
+  </p:timing>
 </p:sld>
 </file>
 
@@ -6973,6 +8575,13 @@
   <p:clrMapOvr>
     <a:masterClrMapping/>
   </p:clrMapOvr>
+  <p:timing>
+    <p:tnLst>
+      <p:par>
+        <p:cTn id="1" dur="indefinite" restart="never" nodeType="tmRoot"/>
+      </p:par>
+    </p:tnLst>
+  </p:timing>
 </p:sld>
 </file>
 
@@ -7134,6 +8743,13 @@
   <p:clrMapOvr>
     <a:masterClrMapping/>
   </p:clrMapOvr>
+  <p:timing>
+    <p:tnLst>
+      <p:par>
+        <p:cTn id="1" dur="indefinite" restart="never" nodeType="tmRoot"/>
+      </p:par>
+    </p:tnLst>
+  </p:timing>
 </p:sld>
 </file>
 
@@ -7385,6 +9001,13 @@
   <p:clrMapOvr>
     <a:masterClrMapping/>
   </p:clrMapOvr>
+  <p:timing>
+    <p:tnLst>
+      <p:par>
+        <p:cTn id="1" dur="indefinite" restart="never" nodeType="tmRoot"/>
+      </p:par>
+    </p:tnLst>
+  </p:timing>
 </p:sld>
 </file>
 
@@ -7620,6 +9243,13 @@
   <p:clrMapOvr>
     <a:masterClrMapping/>
   </p:clrMapOvr>
+  <p:timing>
+    <p:tnLst>
+      <p:par>
+        <p:cTn id="1" dur="indefinite" restart="never" nodeType="tmRoot"/>
+      </p:par>
+    </p:tnLst>
+  </p:timing>
 </p:sld>
 </file>
 
@@ -7834,6 +9464,13 @@
   <p:clrMapOvr>
     <a:masterClrMapping/>
   </p:clrMapOvr>
+  <p:timing>
+    <p:tnLst>
+      <p:par>
+        <p:cTn id="1" dur="indefinite" restart="never" nodeType="tmRoot"/>
+      </p:par>
+    </p:tnLst>
+  </p:timing>
 </p:sld>
 </file>
 
@@ -8196,6 +9833,13 @@
   <p:clrMapOvr>
     <a:masterClrMapping/>
   </p:clrMapOvr>
+  <p:timing>
+    <p:tnLst>
+      <p:par>
+        <p:cTn id="1" dur="indefinite" restart="never" nodeType="tmRoot"/>
+      </p:par>
+    </p:tnLst>
+  </p:timing>
 </p:sld>
 </file>
 

</xml_diff>